<commit_message>
updated wireframes based on feedback from product review. Updated JIRA artifact screenshots. Added new Documentation/Testing/ path with some testing results
</commit_message>
<xml_diff>
--- a/Documentation/Design/Wireframes/DRIC wireframes.pptx
+++ b/Documentation/Design/Wireframes/DRIC wireframes.pptx
@@ -116,7 +116,7 @@
   </p:defaultTextStyle>
   <p:extLst>
     <p:ext uri="{EFAFB233-063F-42B5-8137-9DF3F51BA10A}">
-      <p15:sldGuideLst xmlns:p15="http://schemas.microsoft.com/office/powerpoint/2012/main">
+      <p15:sldGuideLst xmlns:p15="http://schemas.microsoft.com/office/powerpoint/2012/main" xmlns="">
         <p15:guide id="1" orient="horz" pos="2160">
           <p15:clr>
             <a:srgbClr val="A4A3A4"/>
@@ -215,7 +215,7 @@
           <a:p>
             <a:fld id="{8E93098F-1000-4F85-9F35-40A3F3C1DAF8}" type="datetimeFigureOut">
               <a:rPr lang="en-US" smtClean="0"/>
-              <a:t>6/23/2015</a:t>
+              <a:t>6/24/2015</a:t>
             </a:fld>
             <a:endParaRPr lang="en-US"/>
           </a:p>
@@ -881,7 +881,7 @@
             <a:fld id="{032CCAA4-70F9-4347-A6BC-65B95A477A91}" type="datetimeFigureOut">
               <a:rPr lang="en-US" smtClean="0"/>
               <a:pPr/>
-              <a:t>6/23/2015</a:t>
+              <a:t>6/24/2015</a:t>
             </a:fld>
             <a:endParaRPr lang="en-US"/>
           </a:p>
@@ -1066,7 +1066,7 @@
             <a:fld id="{032CCAA4-70F9-4347-A6BC-65B95A477A91}" type="datetimeFigureOut">
               <a:rPr lang="en-US" smtClean="0"/>
               <a:pPr/>
-              <a:t>6/23/2015</a:t>
+              <a:t>6/24/2015</a:t>
             </a:fld>
             <a:endParaRPr lang="en-US"/>
           </a:p>
@@ -1261,7 +1261,7 @@
             <a:fld id="{032CCAA4-70F9-4347-A6BC-65B95A477A91}" type="datetimeFigureOut">
               <a:rPr lang="en-US" smtClean="0"/>
               <a:pPr/>
-              <a:t>6/23/2015</a:t>
+              <a:t>6/24/2015</a:t>
             </a:fld>
             <a:endParaRPr lang="en-US"/>
           </a:p>
@@ -1454,7 +1454,7 @@
             <a:fld id="{032CCAA4-70F9-4347-A6BC-65B95A477A91}" type="datetimeFigureOut">
               <a:rPr lang="en-US" smtClean="0"/>
               <a:pPr/>
-              <a:t>6/23/2015</a:t>
+              <a:t>6/24/2015</a:t>
             </a:fld>
             <a:endParaRPr lang="en-US"/>
           </a:p>
@@ -1661,7 +1661,7 @@
             <a:fld id="{032CCAA4-70F9-4347-A6BC-65B95A477A91}" type="datetimeFigureOut">
               <a:rPr lang="en-US" smtClean="0"/>
               <a:pPr/>
-              <a:t>6/23/2015</a:t>
+              <a:t>6/24/2015</a:t>
             </a:fld>
             <a:endParaRPr lang="en-US"/>
           </a:p>
@@ -1964,7 +1964,7 @@
             <a:fld id="{032CCAA4-70F9-4347-A6BC-65B95A477A91}" type="datetimeFigureOut">
               <a:rPr lang="en-US" smtClean="0"/>
               <a:pPr/>
-              <a:t>6/23/2015</a:t>
+              <a:t>6/24/2015</a:t>
             </a:fld>
             <a:endParaRPr lang="en-US"/>
           </a:p>
@@ -2406,7 +2406,7 @@
             <a:fld id="{032CCAA4-70F9-4347-A6BC-65B95A477A91}" type="datetimeFigureOut">
               <a:rPr lang="en-US" smtClean="0"/>
               <a:pPr/>
-              <a:t>6/23/2015</a:t>
+              <a:t>6/24/2015</a:t>
             </a:fld>
             <a:endParaRPr lang="en-US"/>
           </a:p>
@@ -2539,7 +2539,7 @@
             <a:fld id="{032CCAA4-70F9-4347-A6BC-65B95A477A91}" type="datetimeFigureOut">
               <a:rPr lang="en-US" smtClean="0"/>
               <a:pPr/>
-              <a:t>6/23/2015</a:t>
+              <a:t>6/24/2015</a:t>
             </a:fld>
             <a:endParaRPr lang="en-US"/>
           </a:p>
@@ -2649,7 +2649,7 @@
             <a:fld id="{032CCAA4-70F9-4347-A6BC-65B95A477A91}" type="datetimeFigureOut">
               <a:rPr lang="en-US" smtClean="0"/>
               <a:pPr/>
-              <a:t>6/23/2015</a:t>
+              <a:t>6/24/2015</a:t>
             </a:fld>
             <a:endParaRPr lang="en-US"/>
           </a:p>
@@ -2941,7 +2941,7 @@
             <a:fld id="{032CCAA4-70F9-4347-A6BC-65B95A477A91}" type="datetimeFigureOut">
               <a:rPr lang="en-US" smtClean="0"/>
               <a:pPr/>
-              <a:t>6/23/2015</a:t>
+              <a:t>6/24/2015</a:t>
             </a:fld>
             <a:endParaRPr lang="en-US"/>
           </a:p>
@@ -3213,7 +3213,7 @@
             <a:fld id="{032CCAA4-70F9-4347-A6BC-65B95A477A91}" type="datetimeFigureOut">
               <a:rPr lang="en-US" smtClean="0"/>
               <a:pPr/>
-              <a:t>6/23/2015</a:t>
+              <a:t>6/24/2015</a:t>
             </a:fld>
             <a:endParaRPr lang="en-US"/>
           </a:p>
@@ -3468,7 +3468,7 @@
             <a:fld id="{032CCAA4-70F9-4347-A6BC-65B95A477A91}" type="datetimeFigureOut">
               <a:rPr lang="en-US" smtClean="0"/>
               <a:pPr/>
-              <a:t>6/23/2015</a:t>
+              <a:t>6/24/2015</a:t>
             </a:fld>
             <a:endParaRPr lang="en-US"/>
           </a:p>
@@ -4534,14 +4534,14 @@
           <p:nvPr>
             <p:extLst>
               <p:ext uri="{D42A27DB-BD31-4B8C-83A1-F6EECF244321}">
-                <p14:modId xmlns:p14="http://schemas.microsoft.com/office/powerpoint/2010/main" val="3541950731"/>
+                <p14:modId xmlns:p14="http://schemas.microsoft.com/office/powerpoint/2010/main" val="3285026270"/>
               </p:ext>
             </p:extLst>
           </p:nvPr>
         </p:nvGraphicFramePr>
         <p:xfrm>
           <a:off x="1502228" y="1981200"/>
-          <a:ext cx="6096000" cy="2763520"/>
+          <a:ext cx="6096000" cy="3403600"/>
         </p:xfrm>
         <a:graphic>
           <a:graphicData uri="http://schemas.openxmlformats.org/drawingml/2006/table">
@@ -4828,6 +4828,7 @@
                     <a:bodyPr/>
                     <a:lstStyle/>
                     <a:p>
+                      <a:pPr algn="ctr"/>
                       <a:r>
                         <a:rPr lang="en-US" dirty="0" smtClean="0"/>
                         <a:t>1.4</a:t>
@@ -4859,6 +4860,59 @@
                       <a:r>
                         <a:rPr lang="en-US" dirty="0" smtClean="0"/>
                         <a:t>Updated per 6/23 11:00 AM demo</a:t>
+                      </a:r>
+                      <a:endParaRPr lang="en-US" dirty="0"/>
+                    </a:p>
+                  </a:txBody>
+                  <a:tcPr/>
+                </a:tc>
+              </a:tr>
+              <a:tr h="370840">
+                <a:tc>
+                  <a:txBody>
+                    <a:bodyPr/>
+                    <a:lstStyle/>
+                    <a:p>
+                      <a:pPr algn="ctr"/>
+                      <a:r>
+                        <a:rPr lang="en-US" dirty="0" smtClean="0"/>
+                        <a:t>1.5</a:t>
+                      </a:r>
+                      <a:endParaRPr lang="en-US" dirty="0"/>
+                    </a:p>
+                  </a:txBody>
+                  <a:tcPr/>
+                </a:tc>
+                <a:tc>
+                  <a:txBody>
+                    <a:bodyPr/>
+                    <a:lstStyle/>
+                    <a:p>
+                      <a:r>
+                        <a:rPr lang="en-US" dirty="0" smtClean="0"/>
+                        <a:t>6/24/2015</a:t>
+                      </a:r>
+                      <a:endParaRPr lang="en-US" dirty="0"/>
+                    </a:p>
+                  </a:txBody>
+                  <a:tcPr/>
+                </a:tc>
+                <a:tc>
+                  <a:txBody>
+                    <a:bodyPr/>
+                    <a:lstStyle/>
+                    <a:p>
+                      <a:r>
+                        <a:rPr lang="en-US" dirty="0" smtClean="0"/>
+                        <a:t>Updated per 6/24</a:t>
+                      </a:r>
+                      <a:r>
+                        <a:rPr lang="en-US" baseline="0" dirty="0" smtClean="0"/>
+                        <a:t> 5:00 PM </a:t>
+                      </a:r>
+                      <a:r>
+                        <a:rPr lang="en-US" dirty="0" smtClean="0"/>
+                        <a:t>testing results discussion </a:t>
                       </a:r>
                       <a:endParaRPr lang="en-US" dirty="0"/>
                     </a:p>
@@ -5025,13 +5079,8 @@
             </a:r>
             <a:r>
               <a:rPr lang="en-US" sz="1600" dirty="0" smtClean="0"/>
-              <a:t>Result do NOT show</a:t>
-            </a:r>
-            <a:r>
-              <a:rPr lang="en-US" sz="1600" dirty="0" smtClean="0"/>
-              <a:t>.</a:t>
-            </a:r>
-            <a:endParaRPr lang="en-US" sz="1600" dirty="0" smtClean="0"/>
+              <a:t>Result do NOT show.</a:t>
+            </a:r>
           </a:p>
           <a:p>
             <a:endParaRPr lang="en-US" sz="1600" dirty="0"/>
@@ -5099,23 +5148,25 @@
           <a:p>
             <a:r>
               <a:rPr lang="en-US" sz="1600" dirty="0" smtClean="0"/>
-              <a:t>Display </a:t>
-            </a:r>
+              <a:t>Display up to 100 results</a:t>
+            </a:r>
+          </a:p>
+          <a:p>
+            <a:endParaRPr lang="en-US" sz="1600" dirty="0"/>
+          </a:p>
+          <a:p>
             <a:r>
               <a:rPr lang="en-US" sz="1600" dirty="0" smtClean="0"/>
-              <a:t>up to 100 results</a:t>
-            </a:r>
-            <a:endParaRPr lang="en-US" sz="1600" dirty="0" smtClean="0"/>
-          </a:p>
-          <a:p>
-            <a:endParaRPr lang="en-US" sz="1600" dirty="0"/>
-          </a:p>
-          <a:p>
+              <a:t>Recall Description = Recall Description up to first comma or </a:t>
+            </a:r>
             <a:r>
               <a:rPr lang="en-US" sz="1600" dirty="0" smtClean="0"/>
-              <a:t>Recall Description = Recall Description up to first comma or 50 characters</a:t>
-            </a:r>
-            <a:endParaRPr lang="en-US" sz="1600" dirty="0" smtClean="0"/>
+              <a:t>100 </a:t>
+            </a:r>
+            <a:r>
+              <a:rPr lang="en-US" sz="1600" dirty="0" smtClean="0"/>
+              <a:t>characters</a:t>
+            </a:r>
           </a:p>
         </p:txBody>
       </p:sp>
@@ -5335,8 +5386,8 @@
           </p:nvSpPr>
           <p:spPr>
             <a:xfrm>
-              <a:off x="1542597" y="2561786"/>
-              <a:ext cx="4184648" cy="246221"/>
+              <a:off x="1542596" y="2561786"/>
+              <a:ext cx="4782003" cy="246221"/>
             </a:xfrm>
             <a:prstGeom prst="rect">
               <a:avLst/>
@@ -5350,20 +5401,40 @@
             <a:lstStyle/>
             <a:p>
               <a:r>
-                <a:rPr lang="en-US" sz="1000" dirty="0" smtClean="0"/>
-                <a:t>	      </a:t>
+                <a:rPr lang="en-US" sz="1000" dirty="0"/>
+                <a:t> </a:t>
               </a:r>
               <a:r>
                 <a:rPr lang="en-US" sz="1000" dirty="0" smtClean="0"/>
-                <a:t>Recall Description (Short Name), </a:t>
+                <a:t>             </a:t>
               </a:r>
               <a:r>
                 <a:rPr lang="en-US" sz="1000" dirty="0" smtClean="0"/>
-                <a:t>Report  </a:t>
+                <a:t> </a:t>
               </a:r>
               <a:r>
                 <a:rPr lang="en-US" sz="1000" dirty="0" smtClean="0"/>
-                <a:t>Date</a:t>
+                <a:t>Report </a:t>
+              </a:r>
+              <a:r>
+                <a:rPr lang="en-US" altLang="en-US" sz="1000" b="1" dirty="0" smtClean="0">
+                  <a:latin typeface="Arial" panose="020B0604020202020204" pitchFamily="34" charset="0"/>
+                  <a:ea typeface="Calibri" panose="020F0502020204030204" pitchFamily="34" charset="0"/>
+                  <a:cs typeface="Arial" panose="020B0604020202020204" pitchFamily="34" charset="0"/>
+                </a:rPr>
+                <a:t>N</a:t>
+              </a:r>
+              <a:r>
+                <a:rPr lang="en-US" sz="1000" dirty="0" smtClean="0"/>
+                <a:t>umber, </a:t>
+              </a:r>
+              <a:r>
+                <a:rPr lang="en-US" sz="1000" dirty="0" smtClean="0"/>
+                <a:t>Recall </a:t>
+              </a:r>
+              <a:r>
+                <a:rPr lang="en-US" sz="1000" dirty="0" smtClean="0"/>
+                <a:t>Description (Short Name), Report  Date</a:t>
               </a:r>
               <a:endParaRPr lang="en-US" sz="1000" dirty="0"/>
             </a:p>
@@ -5908,7 +5979,7 @@
           </p:nvSpPr>
           <p:spPr>
             <a:xfrm>
-              <a:off x="2143451" y="4267200"/>
+              <a:off x="2143451" y="4461263"/>
               <a:ext cx="719492" cy="666070"/>
             </a:xfrm>
             <a:prstGeom prst="rect">
@@ -5969,8 +6040,8 @@
         </p:nvSpPr>
         <p:spPr>
           <a:xfrm>
-            <a:off x="1166597" y="3342659"/>
-            <a:ext cx="4171938" cy="400110"/>
+            <a:off x="1166597" y="3276600"/>
+            <a:ext cx="4171938" cy="553998"/>
           </a:xfrm>
           <a:prstGeom prst="rect">
             <a:avLst/>
@@ -5991,7 +6062,29 @@
           <a:p>
             <a:r>
               <a:rPr lang="en-US" sz="1000" dirty="0" smtClean="0"/>
-              <a:t>Report Date: 12/4/10</a:t>
+              <a:t>Report Date: </a:t>
+            </a:r>
+            <a:r>
+              <a:rPr lang="en-US" sz="1000" dirty="0" smtClean="0"/>
+              <a:t>12/4/2015</a:t>
+            </a:r>
+          </a:p>
+          <a:p>
+            <a:r>
+              <a:rPr lang="en-US" sz="1000" dirty="0" smtClean="0"/>
+              <a:t>Report </a:t>
+            </a:r>
+            <a:r>
+              <a:rPr lang="en-US" altLang="en-US" sz="1000" b="1" dirty="0" smtClean="0">
+                <a:latin typeface="Arial" panose="020B0604020202020204" pitchFamily="34" charset="0"/>
+                <a:ea typeface="Calibri" panose="020F0502020204030204" pitchFamily="34" charset="0"/>
+                <a:cs typeface="Arial" panose="020B0604020202020204" pitchFamily="34" charset="0"/>
+              </a:rPr>
+              <a:t>N</a:t>
+            </a:r>
+            <a:r>
+              <a:rPr lang="en-US" sz="1000" dirty="0" smtClean="0"/>
+              <a:t>umber: S-123-234</a:t>
             </a:r>
             <a:endParaRPr lang="en-US" sz="1000" dirty="0"/>
           </a:p>
@@ -6006,7 +6099,7 @@
         <p:spPr>
           <a:xfrm>
             <a:off x="1166597" y="3805169"/>
-            <a:ext cx="4171938" cy="400110"/>
+            <a:ext cx="4171938" cy="553998"/>
           </a:xfrm>
           <a:prstGeom prst="rect">
             <a:avLst/>
@@ -6027,7 +6120,29 @@
           <a:p>
             <a:r>
               <a:rPr lang="en-US" sz="1000" dirty="0" smtClean="0"/>
-              <a:t>Report Date: 5/29/15</a:t>
+              <a:t>Report Date: </a:t>
+            </a:r>
+            <a:r>
+              <a:rPr lang="en-US" sz="1000" dirty="0" smtClean="0"/>
+              <a:t>5/29/2015</a:t>
+            </a:r>
+          </a:p>
+          <a:p>
+            <a:r>
+              <a:rPr lang="en-US" sz="1000" dirty="0" smtClean="0"/>
+              <a:t>Report </a:t>
+            </a:r>
+            <a:r>
+              <a:rPr lang="en-US" altLang="en-US" sz="1000" b="1" dirty="0" smtClean="0">
+                <a:latin typeface="Arial" panose="020B0604020202020204" pitchFamily="34" charset="0"/>
+                <a:ea typeface="Calibri" panose="020F0502020204030204" pitchFamily="34" charset="0"/>
+                <a:cs typeface="Arial" panose="020B0604020202020204" pitchFamily="34" charset="0"/>
+              </a:rPr>
+              <a:t>N</a:t>
+            </a:r>
+            <a:r>
+              <a:rPr lang="en-US" sz="1000" dirty="0" smtClean="0"/>
+              <a:t>umber: D-234-23</a:t>
             </a:r>
             <a:endParaRPr lang="en-US" sz="1000" dirty="0"/>
           </a:p>
@@ -6041,8 +6156,8 @@
         </p:nvSpPr>
         <p:spPr>
           <a:xfrm>
-            <a:off x="1155697" y="4222938"/>
-            <a:ext cx="4171938" cy="400110"/>
+            <a:off x="1155697" y="4322802"/>
+            <a:ext cx="4171938" cy="553998"/>
           </a:xfrm>
           <a:prstGeom prst="rect">
             <a:avLst/>
@@ -6063,7 +6178,29 @@
           <a:p>
             <a:r>
               <a:rPr lang="en-US" sz="1000" dirty="0" smtClean="0"/>
-              <a:t>Report Date: 3/31/13</a:t>
+              <a:t>Report Date: </a:t>
+            </a:r>
+            <a:r>
+              <a:rPr lang="en-US" sz="1000" dirty="0" smtClean="0"/>
+              <a:t>3/31/2013</a:t>
+            </a:r>
+          </a:p>
+          <a:p>
+            <a:r>
+              <a:rPr lang="en-US" sz="1000" dirty="0" smtClean="0"/>
+              <a:t>Report </a:t>
+            </a:r>
+            <a:r>
+              <a:rPr lang="en-US" altLang="en-US" sz="1000" b="1" dirty="0" smtClean="0">
+                <a:latin typeface="Arial" panose="020B0604020202020204" pitchFamily="34" charset="0"/>
+                <a:ea typeface="Calibri" panose="020F0502020204030204" pitchFamily="34" charset="0"/>
+                <a:cs typeface="Arial" panose="020B0604020202020204" pitchFamily="34" charset="0"/>
+              </a:rPr>
+              <a:t>N</a:t>
+            </a:r>
+            <a:r>
+              <a:rPr lang="en-US" sz="1000" dirty="0" smtClean="0"/>
+              <a:t>umber: A-1234</a:t>
             </a:r>
             <a:endParaRPr lang="en-US" sz="1000" dirty="0"/>
           </a:p>
@@ -7477,7 +7614,6 @@
               <a:rPr lang="en-US" sz="1400" dirty="0" smtClean="0"/>
               <a:t>Displays additional information on the drug recall report user has selected to view in detail.</a:t>
             </a:r>
-            <a:endParaRPr lang="en-US" sz="1400" dirty="0" smtClean="0"/>
           </a:p>
           <a:p>
             <a:endParaRPr lang="en-US" sz="1400" dirty="0"/>
@@ -7504,11 +7640,7 @@
           <a:p>
             <a:r>
               <a:rPr lang="en-US" sz="1400" dirty="0" smtClean="0"/>
-              <a:t>(i.e. scroll bar / html bookmarks</a:t>
-            </a:r>
-            <a:r>
-              <a:rPr lang="en-US" sz="1400" dirty="0" smtClean="0"/>
-              <a:t>)</a:t>
+              <a:t>(i.e. scroll bar / html bookmarks)</a:t>
             </a:r>
           </a:p>
           <a:p>
@@ -7630,7 +7762,71 @@
                 <a:ea typeface="Calibri" panose="020F0502020204030204" pitchFamily="34" charset="0"/>
                 <a:cs typeface="Arial" panose="020B0604020202020204" pitchFamily="34" charset="0"/>
               </a:rPr>
-              <a:t>notes: Not concerned with field formatting (e.g. dates). Use raw response from API for now.</a:t>
+              <a:t>notes: </a:t>
+            </a:r>
+            <a:r>
+              <a:rPr lang="en-US" altLang="en-US" sz="1400" dirty="0" smtClean="0">
+                <a:latin typeface="Arial" panose="020B0604020202020204" pitchFamily="34" charset="0"/>
+                <a:ea typeface="Calibri" panose="020F0502020204030204" pitchFamily="34" charset="0"/>
+                <a:cs typeface="Arial" panose="020B0604020202020204" pitchFamily="34" charset="0"/>
+              </a:rPr>
+              <a:t>Use </a:t>
+            </a:r>
+            <a:r>
+              <a:rPr lang="en-US" altLang="en-US" sz="1400" dirty="0">
+                <a:latin typeface="Arial" panose="020B0604020202020204" pitchFamily="34" charset="0"/>
+                <a:ea typeface="Calibri" panose="020F0502020204030204" pitchFamily="34" charset="0"/>
+                <a:cs typeface="Arial" panose="020B0604020202020204" pitchFamily="34" charset="0"/>
+              </a:rPr>
+              <a:t>raw response from API for </a:t>
+            </a:r>
+            <a:r>
+              <a:rPr lang="en-US" altLang="en-US" sz="1400" dirty="0" smtClean="0">
+                <a:latin typeface="Arial" panose="020B0604020202020204" pitchFamily="34" charset="0"/>
+                <a:ea typeface="Calibri" panose="020F0502020204030204" pitchFamily="34" charset="0"/>
+                <a:cs typeface="Arial" panose="020B0604020202020204" pitchFamily="34" charset="0"/>
+              </a:rPr>
+              <a:t>now, except for </a:t>
+            </a:r>
+            <a:r>
+              <a:rPr lang="en-US" altLang="en-US" sz="1400" dirty="0">
+                <a:latin typeface="Arial" panose="020B0604020202020204" pitchFamily="34" charset="0"/>
+                <a:ea typeface="Calibri" panose="020F0502020204030204" pitchFamily="34" charset="0"/>
+                <a:cs typeface="Arial" panose="020B0604020202020204" pitchFamily="34" charset="0"/>
+              </a:rPr>
+              <a:t>date which </a:t>
+            </a:r>
+            <a:r>
+              <a:rPr lang="en-US" altLang="en-US" sz="1400" dirty="0" smtClean="0">
+                <a:latin typeface="Arial" panose="020B0604020202020204" pitchFamily="34" charset="0"/>
+                <a:ea typeface="Calibri" panose="020F0502020204030204" pitchFamily="34" charset="0"/>
+                <a:cs typeface="Arial" panose="020B0604020202020204" pitchFamily="34" charset="0"/>
+              </a:rPr>
+              <a:t>needs to be mm/</a:t>
+            </a:r>
+            <a:r>
+              <a:rPr lang="en-US" altLang="en-US" sz="1400" dirty="0" err="1" smtClean="0">
+                <a:latin typeface="Arial" panose="020B0604020202020204" pitchFamily="34" charset="0"/>
+                <a:ea typeface="Calibri" panose="020F0502020204030204" pitchFamily="34" charset="0"/>
+                <a:cs typeface="Arial" panose="020B0604020202020204" pitchFamily="34" charset="0"/>
+              </a:rPr>
+              <a:t>dd</a:t>
+            </a:r>
+            <a:r>
+              <a:rPr lang="en-US" altLang="en-US" sz="1400" dirty="0" smtClean="0">
+                <a:latin typeface="Arial" panose="020B0604020202020204" pitchFamily="34" charset="0"/>
+                <a:ea typeface="Calibri" panose="020F0502020204030204" pitchFamily="34" charset="0"/>
+                <a:cs typeface="Arial" panose="020B0604020202020204" pitchFamily="34" charset="0"/>
+              </a:rPr>
+              <a:t>/</a:t>
+            </a:r>
+            <a:r>
+              <a:rPr lang="en-US" altLang="en-US" sz="1400" dirty="0" err="1" smtClean="0">
+                <a:latin typeface="Arial" panose="020B0604020202020204" pitchFamily="34" charset="0"/>
+                <a:ea typeface="Calibri" panose="020F0502020204030204" pitchFamily="34" charset="0"/>
+                <a:cs typeface="Arial" panose="020B0604020202020204" pitchFamily="34" charset="0"/>
+              </a:rPr>
+              <a:t>yyyy</a:t>
             </a:r>
             <a:endParaRPr lang="en-US" altLang="en-US" sz="1400" dirty="0">
               <a:latin typeface="Arial" panose="020B0604020202020204" pitchFamily="34" charset="0"/>
@@ -7904,19 +8100,7 @@
             <a:p>
               <a:r>
                 <a:rPr lang="en-US" sz="1000" dirty="0" smtClean="0"/>
-                <a:t>	      </a:t>
-              </a:r>
-              <a:r>
-                <a:rPr lang="en-US" sz="1000" dirty="0" smtClean="0"/>
-                <a:t>Recall Description (Short Name), </a:t>
-              </a:r>
-              <a:r>
-                <a:rPr lang="en-US" sz="1000" dirty="0" smtClean="0"/>
-                <a:t>Report  </a:t>
-              </a:r>
-              <a:r>
-                <a:rPr lang="en-US" sz="1000" dirty="0" smtClean="0"/>
-                <a:t>Date</a:t>
+                <a:t>	      Recall Description (Short Name), Report  Date</a:t>
               </a:r>
               <a:endParaRPr lang="en-US" sz="1000" dirty="0"/>
             </a:p>
@@ -9787,7 +9971,7 @@
                 <a:ea typeface="Calibri" panose="020F0502020204030204" pitchFamily="34" charset="0"/>
                 <a:cs typeface="Arial" panose="020B0604020202020204" pitchFamily="34" charset="0"/>
               </a:rPr>
-              <a:t>2015-01-12</a:t>
+              <a:t>01/12/2015</a:t>
             </a:r>
             <a:endParaRPr kumimoji="0" lang="en-US" altLang="en-US" sz="600" b="0" i="0" u="none" strike="noStrike" cap="none" normalizeH="0" baseline="0" dirty="0" smtClean="0">
               <a:ln>
@@ -11096,7 +11280,7 @@
                 <a:ea typeface="Calibri" panose="020F0502020204030204" pitchFamily="34" charset="0"/>
                 <a:cs typeface="Arial" panose="020B0604020202020204" pitchFamily="34" charset="0"/>
               </a:rPr>
-              <a:t>2015-01-12</a:t>
+              <a:t>01/12/2015</a:t>
             </a:r>
             <a:endParaRPr kumimoji="0" lang="en-US" altLang="en-US" sz="600" b="0" i="0" u="none" strike="noStrike" cap="none" normalizeH="0" baseline="0" dirty="0" smtClean="0">
               <a:ln>

</xml_diff>